<commit_message>
Reinstating Bioplanet with a graceful fail
</commit_message>
<xml_diff>
--- a/vignettes/figures/overview.pptx
+++ b/vignettes/figures/overview.pptx
@@ -243,7 +243,7 @@
           <a:p>
             <a:fld id="{93AC8126-CE0A-8F4A-B7EE-D5224E3815C3}" type="datetimeFigureOut">
               <a:rPr lang="en-US" smtClean="0"/>
-              <a:t>10/4/23</a:t>
+              <a:t>1/11/24</a:t>
             </a:fld>
             <a:endParaRPr lang="en-US"/>
           </a:p>
@@ -413,7 +413,7 @@
           <a:p>
             <a:fld id="{93AC8126-CE0A-8F4A-B7EE-D5224E3815C3}" type="datetimeFigureOut">
               <a:rPr lang="en-US" smtClean="0"/>
-              <a:t>10/4/23</a:t>
+              <a:t>1/11/24</a:t>
             </a:fld>
             <a:endParaRPr lang="en-US"/>
           </a:p>
@@ -593,7 +593,7 @@
           <a:p>
             <a:fld id="{93AC8126-CE0A-8F4A-B7EE-D5224E3815C3}" type="datetimeFigureOut">
               <a:rPr lang="en-US" smtClean="0"/>
-              <a:t>10/4/23</a:t>
+              <a:t>1/11/24</a:t>
             </a:fld>
             <a:endParaRPr lang="en-US"/>
           </a:p>
@@ -763,7 +763,7 @@
           <a:p>
             <a:fld id="{93AC8126-CE0A-8F4A-B7EE-D5224E3815C3}" type="datetimeFigureOut">
               <a:rPr lang="en-US" smtClean="0"/>
-              <a:t>10/4/23</a:t>
+              <a:t>1/11/24</a:t>
             </a:fld>
             <a:endParaRPr lang="en-US"/>
           </a:p>
@@ -1007,7 +1007,7 @@
           <a:p>
             <a:fld id="{93AC8126-CE0A-8F4A-B7EE-D5224E3815C3}" type="datetimeFigureOut">
               <a:rPr lang="en-US" smtClean="0"/>
-              <a:t>10/4/23</a:t>
+              <a:t>1/11/24</a:t>
             </a:fld>
             <a:endParaRPr lang="en-US"/>
           </a:p>
@@ -1239,7 +1239,7 @@
           <a:p>
             <a:fld id="{93AC8126-CE0A-8F4A-B7EE-D5224E3815C3}" type="datetimeFigureOut">
               <a:rPr lang="en-US" smtClean="0"/>
-              <a:t>10/4/23</a:t>
+              <a:t>1/11/24</a:t>
             </a:fld>
             <a:endParaRPr lang="en-US"/>
           </a:p>
@@ -1606,7 +1606,7 @@
           <a:p>
             <a:fld id="{93AC8126-CE0A-8F4A-B7EE-D5224E3815C3}" type="datetimeFigureOut">
               <a:rPr lang="en-US" smtClean="0"/>
-              <a:t>10/4/23</a:t>
+              <a:t>1/11/24</a:t>
             </a:fld>
             <a:endParaRPr lang="en-US"/>
           </a:p>
@@ -1724,7 +1724,7 @@
           <a:p>
             <a:fld id="{93AC8126-CE0A-8F4A-B7EE-D5224E3815C3}" type="datetimeFigureOut">
               <a:rPr lang="en-US" smtClean="0"/>
-              <a:t>10/4/23</a:t>
+              <a:t>1/11/24</a:t>
             </a:fld>
             <a:endParaRPr lang="en-US"/>
           </a:p>
@@ -1819,7 +1819,7 @@
           <a:p>
             <a:fld id="{93AC8126-CE0A-8F4A-B7EE-D5224E3815C3}" type="datetimeFigureOut">
               <a:rPr lang="en-US" smtClean="0"/>
-              <a:t>10/4/23</a:t>
+              <a:t>1/11/24</a:t>
             </a:fld>
             <a:endParaRPr lang="en-US"/>
           </a:p>
@@ -2096,7 +2096,7 @@
           <a:p>
             <a:fld id="{93AC8126-CE0A-8F4A-B7EE-D5224E3815C3}" type="datetimeFigureOut">
               <a:rPr lang="en-US" smtClean="0"/>
-              <a:t>10/4/23</a:t>
+              <a:t>1/11/24</a:t>
             </a:fld>
             <a:endParaRPr lang="en-US"/>
           </a:p>
@@ -2353,7 +2353,7 @@
           <a:p>
             <a:fld id="{93AC8126-CE0A-8F4A-B7EE-D5224E3815C3}" type="datetimeFigureOut">
               <a:rPr lang="en-US" smtClean="0"/>
-              <a:t>10/4/23</a:t>
+              <a:t>1/11/24</a:t>
             </a:fld>
             <a:endParaRPr lang="en-US"/>
           </a:p>
@@ -2566,7 +2566,7 @@
           <a:p>
             <a:fld id="{93AC8126-CE0A-8F4A-B7EE-D5224E3815C3}" type="datetimeFigureOut">
               <a:rPr lang="en-US" smtClean="0"/>
-              <a:t>10/4/23</a:t>
+              <a:t>1/11/24</a:t>
             </a:fld>
             <a:endParaRPr lang="en-US"/>
           </a:p>
@@ -3215,7 +3215,7 @@
         </p:nvSpPr>
         <p:spPr>
           <a:xfrm>
-            <a:off x="479533" y="791437"/>
+            <a:off x="479253" y="1221559"/>
             <a:ext cx="1152000" cy="252000"/>
           </a:xfrm>
           <a:prstGeom prst="flowChartProcess">
@@ -3265,7 +3265,7 @@
         </p:nvSpPr>
         <p:spPr>
           <a:xfrm>
-            <a:off x="479533" y="1216222"/>
+            <a:off x="479253" y="1642140"/>
             <a:ext cx="1152000" cy="252000"/>
           </a:xfrm>
           <a:prstGeom prst="flowChartProcess">
@@ -3315,7 +3315,7 @@
         </p:nvSpPr>
         <p:spPr>
           <a:xfrm>
-            <a:off x="479533" y="1641007"/>
+            <a:off x="2483779" y="1844061"/>
             <a:ext cx="1152000" cy="252000"/>
           </a:xfrm>
           <a:prstGeom prst="flowChartProcess">
@@ -3365,7 +3365,7 @@
         </p:nvSpPr>
         <p:spPr>
           <a:xfrm>
-            <a:off x="479533" y="2065791"/>
+            <a:off x="2481203" y="1409267"/>
             <a:ext cx="1152000" cy="252000"/>
           </a:xfrm>
           <a:prstGeom prst="flowChartProcess">
@@ -3418,8 +3418,8 @@
         </p:nvCxnSpPr>
         <p:spPr>
           <a:xfrm>
-            <a:off x="1631533" y="917437"/>
-            <a:ext cx="870369" cy="1706374"/>
+            <a:off x="1631253" y="1347559"/>
+            <a:ext cx="456579" cy="1271014"/>
           </a:xfrm>
           <a:prstGeom prst="curvedConnector2">
             <a:avLst/>
@@ -3460,8 +3460,8 @@
         </p:nvCxnSpPr>
         <p:spPr>
           <a:xfrm>
-            <a:off x="1631533" y="1342222"/>
-            <a:ext cx="673519" cy="1281588"/>
+            <a:off x="1631253" y="1768140"/>
+            <a:ext cx="298048" cy="850433"/>
           </a:xfrm>
           <a:prstGeom prst="curvedConnector2">
             <a:avLst/>
@@ -3496,14 +3496,14 @@
           </p:cNvPr>
           <p:cNvCxnSpPr>
             <a:cxnSpLocks/>
-            <a:stCxn id="14" idx="3"/>
+            <a:stCxn id="14" idx="1"/>
           </p:cNvCxnSpPr>
           <p:nvPr/>
         </p:nvCxnSpPr>
         <p:spPr>
-          <a:xfrm>
-            <a:off x="1631533" y="1767007"/>
-            <a:ext cx="470319" cy="856805"/>
+          <a:xfrm rot="10800000" flipV="1">
+            <a:off x="2369015" y="1970061"/>
+            <a:ext cx="114765" cy="648512"/>
           </a:xfrm>
           <a:prstGeom prst="curvedConnector2">
             <a:avLst/>
@@ -3538,14 +3538,14 @@
           </p:cNvPr>
           <p:cNvCxnSpPr>
             <a:cxnSpLocks/>
-            <a:stCxn id="15" idx="3"/>
+            <a:stCxn id="15" idx="1"/>
           </p:cNvCxnSpPr>
           <p:nvPr/>
         </p:nvCxnSpPr>
         <p:spPr>
-          <a:xfrm>
-            <a:off x="1631533" y="2191791"/>
-            <a:ext cx="272125" cy="439254"/>
+          <a:xfrm rot="10800000" flipV="1">
+            <a:off x="2223119" y="1535267"/>
+            <a:ext cx="258084" cy="1083306"/>
           </a:xfrm>
           <a:prstGeom prst="curvedConnector2">
             <a:avLst/>
@@ -3809,9 +3809,9 @@
           <p:nvPr/>
         </p:nvCxnSpPr>
         <p:spPr>
-          <a:xfrm flipH="1">
-            <a:off x="3253400" y="1426462"/>
-            <a:ext cx="626736" cy="1204585"/>
+          <a:xfrm>
+            <a:off x="4293548" y="1140103"/>
+            <a:ext cx="0" cy="1478470"/>
           </a:xfrm>
           <a:prstGeom prst="straightConnector1">
             <a:avLst/>
@@ -4629,7 +4629,7 @@
         </p:nvSpPr>
         <p:spPr>
           <a:xfrm>
-            <a:off x="3356011" y="1174460"/>
+            <a:off x="3769423" y="888103"/>
             <a:ext cx="1111250" cy="252000"/>
           </a:xfrm>
           <a:prstGeom prst="parallelogram">
@@ -4674,6 +4674,98 @@
           </a:p>
         </p:txBody>
       </p:sp>
+      <p:sp>
+        <p:nvSpPr>
+          <p:cNvPr id="4" name="Process 3">
+            <a:extLst>
+              <a:ext uri="{FF2B5EF4-FFF2-40B4-BE49-F238E27FC236}">
+                <a16:creationId xmlns:a16="http://schemas.microsoft.com/office/drawing/2014/main" id="{82C75161-4078-CB32-9ABD-26CEF87783E6}"/>
+              </a:ext>
+            </a:extLst>
+          </p:cNvPr>
+          <p:cNvSpPr/>
+          <p:nvPr/>
+        </p:nvSpPr>
+        <p:spPr>
+          <a:xfrm>
+            <a:off x="479253" y="2039572"/>
+            <a:ext cx="1152000" cy="252000"/>
+          </a:xfrm>
+          <a:prstGeom prst="flowChartProcess">
+            <a:avLst/>
+          </a:prstGeom>
+        </p:spPr>
+        <p:style>
+          <a:lnRef idx="2">
+            <a:schemeClr val="accent1">
+              <a:shade val="15000"/>
+            </a:schemeClr>
+          </a:lnRef>
+          <a:fillRef idx="1">
+            <a:schemeClr val="accent1"/>
+          </a:fillRef>
+          <a:effectRef idx="0">
+            <a:schemeClr val="accent1"/>
+          </a:effectRef>
+          <a:fontRef idx="minor">
+            <a:schemeClr val="lt1"/>
+          </a:fontRef>
+        </p:style>
+        <p:txBody>
+          <a:bodyPr rtlCol="0" anchor="ctr"/>
+          <a:lstStyle/>
+          <a:p>
+            <a:pPr algn="ctr"/>
+            <a:r>
+              <a:rPr lang="en-US" sz="1100" dirty="0" err="1"/>
+              <a:t>fetch_bp</a:t>
+            </a:r>
+            <a:endParaRPr lang="en-US" sz="1100" dirty="0"/>
+          </a:p>
+        </p:txBody>
+      </p:sp>
+      <p:cxnSp>
+        <p:nvCxnSpPr>
+          <p:cNvPr id="7" name="Curved Connector 6">
+            <a:extLst>
+              <a:ext uri="{FF2B5EF4-FFF2-40B4-BE49-F238E27FC236}">
+                <a16:creationId xmlns:a16="http://schemas.microsoft.com/office/drawing/2014/main" id="{77CEB842-3C58-168A-634B-A993D1392396}"/>
+              </a:ext>
+            </a:extLst>
+          </p:cNvPr>
+          <p:cNvCxnSpPr>
+            <a:cxnSpLocks/>
+            <a:stCxn id="4" idx="3"/>
+          </p:cNvCxnSpPr>
+          <p:nvPr/>
+        </p:nvCxnSpPr>
+        <p:spPr>
+          <a:xfrm>
+            <a:off x="1631253" y="2165572"/>
+            <a:ext cx="162872" cy="458238"/>
+          </a:xfrm>
+          <a:prstGeom prst="curvedConnector2">
+            <a:avLst/>
+          </a:prstGeom>
+          <a:ln w="12700">
+            <a:tailEnd type="triangle"/>
+          </a:ln>
+        </p:spPr>
+        <p:style>
+          <a:lnRef idx="1">
+            <a:schemeClr val="accent1"/>
+          </a:lnRef>
+          <a:fillRef idx="0">
+            <a:schemeClr val="accent1"/>
+          </a:fillRef>
+          <a:effectRef idx="0">
+            <a:schemeClr val="accent1"/>
+          </a:effectRef>
+          <a:fontRef idx="minor">
+            <a:schemeClr val="tx1"/>
+          </a:fontRef>
+        </p:style>
+      </p:cxnSp>
     </p:spTree>
     <p:extLst>
       <p:ext uri="{BB962C8B-B14F-4D97-AF65-F5344CB8AC3E}">

</xml_diff>